<commit_message>
added video on instructions import and from
</commit_message>
<xml_diff>
--- a/semaine4/CO12AL-W4-VIDEO02-SLIDE01.pptx
+++ b/semaine4/CO12AL-W4-VIDEO02-SLIDE01.pptx
@@ -1046,15 +1046,22 @@
           <a:p>
             <a:r>
               <a:rPr lang="fr-FR" dirty="0" smtClean="0"/>
-              <a:t>À aucune moment on ne change la référence</a:t>
+              <a:t>L’importation</a:t>
             </a:r>
             <a:r>
               <a:rPr lang="fr-FR" baseline="0" dirty="0" smtClean="0"/>
-              <a:t> de la variable globale L, c’est-à-dire le lien entre L du module et l’objet, par contre, f() modifie directement l’objet qui </a:t>
+              <a:t> d’un module se fait ligne par ligne de manière séquentielle, mais sans exécuter le code des fonctions avant leur appel. </a:t>
+            </a:r>
+            <a:endParaRPr lang="fr-FR" baseline="0" dirty="0" smtClean="0"/>
+          </a:p>
+          <a:p>
+            <a:r>
+              <a:rPr lang="fr-FR" baseline="0" dirty="0" smtClean="0"/>
+              <a:t>Pour chercher les différentes variables on utilise la notion de scope qui </a:t>
             </a:r>
             <a:r>
               <a:rPr lang="fr-FR" baseline="0" smtClean="0"/>
-              <a:t>est mutable. </a:t>
+              <a:t>est textuelle. </a:t>
             </a:r>
             <a:endParaRPr lang="fr-FR" dirty="0"/>
           </a:p>
@@ -4465,14 +4472,7 @@
                 <a:latin typeface="Courier New" panose="02070309020205020404" pitchFamily="49" charset="0"/>
                 <a:cs typeface="Courier New" panose="02070309020205020404" pitchFamily="49" charset="0"/>
               </a:rPr>
-              <a:t> </a:t>
-            </a:r>
-            <a:r>
-              <a:rPr lang="fr-FR" dirty="0" smtClean="0">
-                <a:latin typeface="Courier New" panose="02070309020205020404" pitchFamily="49" charset="0"/>
-                <a:cs typeface="Courier New" panose="02070309020205020404" pitchFamily="49" charset="0"/>
-              </a:rPr>
-              <a:t>x</a:t>
+              <a:t> x</a:t>
             </a:r>
             <a:endParaRPr lang="fr-FR" dirty="0">
               <a:latin typeface="Courier New" panose="02070309020205020404" pitchFamily="49" charset="0"/>
@@ -4720,7 +4720,7 @@
         </p:nvSpPr>
         <p:spPr>
           <a:xfrm>
-            <a:off x="2519263" y="4225873"/>
+            <a:off x="497396" y="4619768"/>
             <a:ext cx="561562" cy="584775"/>
           </a:xfrm>
           <a:prstGeom prst="rect">
@@ -4756,7 +4756,7 @@
         </p:nvSpPr>
         <p:spPr>
           <a:xfrm>
-            <a:off x="2800044" y="4180887"/>
+            <a:off x="778177" y="4574782"/>
             <a:ext cx="6484738" cy="584775"/>
           </a:xfrm>
           <a:prstGeom prst="rect">

</xml_diff>